<commit_message>
Add A06 and A07.
</commit_message>
<xml_diff>
--- a/IMGD-2900/A05/presentation.pptx
+++ b/IMGD-2900/A05/presentation.pptx
@@ -121,7 +121,6 @@
 <file path=ppt/revisionInfo.xml><?xml version="1.0" encoding="utf-8"?>
 <p1510:revInfo xmlns:a="http://schemas.openxmlformats.org/drawingml/2006/main" xmlns:r="http://schemas.openxmlformats.org/officeDocument/2006/relationships" xmlns:p1510="http://schemas.microsoft.com/office/powerpoint/2015/10/main">
   <p1510:revLst>
-    <p1510:client id="{2D712587-3DFA-2612-41DE-8AF55409488D}" v="339" dt="2020-04-11T00:16:43.652"/>
     <p1510:client id="{D73B6134-1C74-4B72-98EA-3CDCAC8AF1A3}" v="1357" dt="2020-04-02T16:00:56.820"/>
   </p1510:revLst>
 </p1510:revInfo>
@@ -643,7 +642,7 @@
           <a:p>
             <a:fld id="{6010868D-1D99-4080-97A4-3B9C19750F80}" type="datetimeFigureOut">
               <a:rPr lang="en-US" smtClean="0"/>
-              <a:t>4/10/2020</a:t>
+              <a:t>4/15/2020</a:t>
             </a:fld>
             <a:endParaRPr lang="en-US"/>
           </a:p>
@@ -841,7 +840,7 @@
           <a:p>
             <a:fld id="{6010868D-1D99-4080-97A4-3B9C19750F80}" type="datetimeFigureOut">
               <a:rPr lang="en-US" smtClean="0"/>
-              <a:t>4/10/2020</a:t>
+              <a:t>4/15/2020</a:t>
             </a:fld>
             <a:endParaRPr lang="en-US"/>
           </a:p>
@@ -1049,7 +1048,7 @@
           <a:p>
             <a:fld id="{6010868D-1D99-4080-97A4-3B9C19750F80}" type="datetimeFigureOut">
               <a:rPr lang="en-US" smtClean="0"/>
-              <a:t>4/10/2020</a:t>
+              <a:t>4/15/2020</a:t>
             </a:fld>
             <a:endParaRPr lang="en-US"/>
           </a:p>
@@ -1247,7 +1246,7 @@
           <a:p>
             <a:fld id="{6010868D-1D99-4080-97A4-3B9C19750F80}" type="datetimeFigureOut">
               <a:rPr lang="en-US" smtClean="0"/>
-              <a:t>4/10/2020</a:t>
+              <a:t>4/15/2020</a:t>
             </a:fld>
             <a:endParaRPr lang="en-US"/>
           </a:p>
@@ -1522,7 +1521,7 @@
           <a:p>
             <a:fld id="{6010868D-1D99-4080-97A4-3B9C19750F80}" type="datetimeFigureOut">
               <a:rPr lang="en-US" smtClean="0"/>
-              <a:t>4/10/2020</a:t>
+              <a:t>4/15/2020</a:t>
             </a:fld>
             <a:endParaRPr lang="en-US"/>
           </a:p>
@@ -1787,7 +1786,7 @@
           <a:p>
             <a:fld id="{6010868D-1D99-4080-97A4-3B9C19750F80}" type="datetimeFigureOut">
               <a:rPr lang="en-US" smtClean="0"/>
-              <a:t>4/10/2020</a:t>
+              <a:t>4/15/2020</a:t>
             </a:fld>
             <a:endParaRPr lang="en-US"/>
           </a:p>
@@ -2199,7 +2198,7 @@
           <a:p>
             <a:fld id="{6010868D-1D99-4080-97A4-3B9C19750F80}" type="datetimeFigureOut">
               <a:rPr lang="en-US" smtClean="0"/>
-              <a:t>4/10/2020</a:t>
+              <a:t>4/15/2020</a:t>
             </a:fld>
             <a:endParaRPr lang="en-US"/>
           </a:p>
@@ -2340,7 +2339,7 @@
           <a:p>
             <a:fld id="{6010868D-1D99-4080-97A4-3B9C19750F80}" type="datetimeFigureOut">
               <a:rPr lang="en-US" smtClean="0"/>
-              <a:t>4/10/2020</a:t>
+              <a:t>4/15/2020</a:t>
             </a:fld>
             <a:endParaRPr lang="en-US"/>
           </a:p>
@@ -2453,7 +2452,7 @@
           <a:p>
             <a:fld id="{6010868D-1D99-4080-97A4-3B9C19750F80}" type="datetimeFigureOut">
               <a:rPr lang="en-US" smtClean="0"/>
-              <a:t>4/10/2020</a:t>
+              <a:t>4/15/2020</a:t>
             </a:fld>
             <a:endParaRPr lang="en-US"/>
           </a:p>
@@ -2764,7 +2763,7 @@
           <a:p>
             <a:fld id="{6010868D-1D99-4080-97A4-3B9C19750F80}" type="datetimeFigureOut">
               <a:rPr lang="en-US" smtClean="0"/>
-              <a:t>4/10/2020</a:t>
+              <a:t>4/15/2020</a:t>
             </a:fld>
             <a:endParaRPr lang="en-US"/>
           </a:p>
@@ -3052,7 +3051,7 @@
           <a:p>
             <a:fld id="{6010868D-1D99-4080-97A4-3B9C19750F80}" type="datetimeFigureOut">
               <a:rPr lang="en-US" smtClean="0"/>
-              <a:t>4/10/2020</a:t>
+              <a:t>4/15/2020</a:t>
             </a:fld>
             <a:endParaRPr lang="en-US"/>
           </a:p>
@@ -3293,7 +3292,7 @@
           <a:p>
             <a:fld id="{6010868D-1D99-4080-97A4-3B9C19750F80}" type="datetimeFigureOut">
               <a:rPr lang="en-US" smtClean="0"/>
-              <a:t>4/10/2020</a:t>
+              <a:t>4/15/2020</a:t>
             </a:fld>
             <a:endParaRPr lang="en-US"/>
           </a:p>
@@ -4928,18 +4927,18 @@
 </file>
 
 <file path=customXml/item2.xml><?xml version="1.0" encoding="utf-8"?>
+<p:properties xmlns:p="http://schemas.microsoft.com/office/2006/metadata/properties" xmlns:xsi="http://www.w3.org/2001/XMLSchema-instance" xmlns:pc="http://schemas.microsoft.com/office/infopath/2007/PartnerControls">
+  <documentManagement/>
+</p:properties>
+</file>
+
+<file path=customXml/item3.xml><?xml version="1.0" encoding="utf-8"?>
 <?mso-contentType ?>
 <FormTemplates xmlns="http://schemas.microsoft.com/sharepoint/v3/contenttype/forms">
   <Display>DocumentLibraryForm</Display>
   <Edit>DocumentLibraryForm</Edit>
   <New>DocumentLibraryForm</New>
 </FormTemplates>
-</file>
-
-<file path=customXml/item3.xml><?xml version="1.0" encoding="utf-8"?>
-<p:properties xmlns:p="http://schemas.microsoft.com/office/2006/metadata/properties" xmlns:xsi="http://www.w3.org/2001/XMLSchema-instance" xmlns:pc="http://schemas.microsoft.com/office/infopath/2007/PartnerControls">
-  <documentManagement/>
-</p:properties>
 </file>
 
 <file path=customXml/itemProps1.xml><?xml version="1.0" encoding="utf-8"?>
@@ -4962,26 +4961,26 @@
 </file>
 
 <file path=customXml/itemProps2.xml><?xml version="1.0" encoding="utf-8"?>
+<ds:datastoreItem xmlns:ds="http://schemas.openxmlformats.org/officeDocument/2006/customXml" ds:itemID="{892638A1-4AAA-414F-B975-012970FF32D6}">
+  <ds:schemaRefs>
+    <ds:schemaRef ds:uri="http://schemas.microsoft.com/office/infopath/2007/PartnerControls"/>
+    <ds:schemaRef ds:uri="http://purl.org/dc/elements/1.1/"/>
+    <ds:schemaRef ds:uri="http://schemas.microsoft.com/office/2006/metadata/properties"/>
+    <ds:schemaRef ds:uri="d7186fe4-49aa-4e1d-ab17-9e2ac446a68f"/>
+    <ds:schemaRef ds:uri="4c05dffc-2138-45e1-a49a-5c7c267e2aeb"/>
+    <ds:schemaRef ds:uri="http://purl.org/dc/terms/"/>
+    <ds:schemaRef ds:uri="http://schemas.openxmlformats.org/package/2006/metadata/core-properties"/>
+    <ds:schemaRef ds:uri="http://schemas.microsoft.com/office/2006/documentManagement/types"/>
+    <ds:schemaRef ds:uri="http://www.w3.org/XML/1998/namespace"/>
+    <ds:schemaRef ds:uri="http://purl.org/dc/dcmitype/"/>
+  </ds:schemaRefs>
+</ds:datastoreItem>
+</file>
+
+<file path=customXml/itemProps3.xml><?xml version="1.0" encoding="utf-8"?>
 <ds:datastoreItem xmlns:ds="http://schemas.openxmlformats.org/officeDocument/2006/customXml" ds:itemID="{A2CAE20E-A42C-45FF-9F6E-DCDF4AF73AD9}">
   <ds:schemaRefs>
     <ds:schemaRef ds:uri="http://schemas.microsoft.com/sharepoint/v3/contenttype/forms"/>
   </ds:schemaRefs>
 </ds:datastoreItem>
-</file>
-
-<file path=customXml/itemProps3.xml><?xml version="1.0" encoding="utf-8"?>
-<ds:datastoreItem xmlns:ds="http://schemas.openxmlformats.org/officeDocument/2006/customXml" ds:itemID="{892638A1-4AAA-414F-B975-012970FF32D6}">
-  <ds:schemaRefs>
-    <ds:schemaRef ds:uri="http://purl.org/dc/dcmitype/"/>
-    <ds:schemaRef ds:uri="http://schemas.microsoft.com/office/infopath/2007/PartnerControls"/>
-    <ds:schemaRef ds:uri="http://schemas.microsoft.com/office/2006/documentManagement/types"/>
-    <ds:schemaRef ds:uri="http://purl.org/dc/elements/1.1/"/>
-    <ds:schemaRef ds:uri="http://schemas.microsoft.com/office/2006/metadata/properties"/>
-    <ds:schemaRef ds:uri="d7186fe4-49aa-4e1d-ab17-9e2ac446a68f"/>
-    <ds:schemaRef ds:uri="http://purl.org/dc/terms/"/>
-    <ds:schemaRef ds:uri="http://schemas.openxmlformats.org/package/2006/metadata/core-properties"/>
-    <ds:schemaRef ds:uri="4c05dffc-2138-45e1-a49a-5c7c267e2aeb"/>
-    <ds:schemaRef ds:uri="http://www.w3.org/XML/1998/namespace"/>
-  </ds:schemaRefs>
-</ds:datastoreItem>
 </file>
</xml_diff>